<commit_message>
Fix: adjust slide animations
</commit_message>
<xml_diff>
--- a/slides/2025-05-01_Meeting.pptx
+++ b/slides/2025-05-01_Meeting.pptx
@@ -200,7 +200,7 @@
           <a:p>
             <a:fld id="{0D4DC8D2-E98E-4A2E-881A-E72301017346}" type="datetimeFigureOut">
               <a:rPr kumimoji="1" lang="ja-JP" altLang="en-US" smtClean="0"/>
-              <a:t>2025/4/30</a:t>
+              <a:t>2025/5/1</a:t>
             </a:fld>
             <a:endParaRPr kumimoji="1" lang="ja-JP" altLang="en-US"/>
           </a:p>
@@ -2465,8 +2465,8 @@
           </a:p>
         </p:txBody>
       </p:sp>
-      <mc:AlternateContent xmlns:mc="http://schemas.openxmlformats.org/markup-compatibility/2006">
-        <mc:Choice xmlns:a14="http://schemas.microsoft.com/office/drawing/2010/main" Requires="a14">
+      <mc:AlternateContent xmlns:mc="http://schemas.openxmlformats.org/markup-compatibility/2006" xmlns:a14="http://schemas.microsoft.com/office/drawing/2010/main">
+        <mc:Choice Requires="a14">
           <p:sp>
             <p:nvSpPr>
               <p:cNvPr id="5" name="正方形/長方形 4">
@@ -2562,7 +2562,7 @@
             </p:txBody>
           </p:sp>
         </mc:Choice>
-        <mc:Fallback>
+        <mc:Fallback xmlns="">
           <p:sp>
             <p:nvSpPr>
               <p:cNvPr id="5" name="正方形/長方形 4">
@@ -2688,8 +2688,8 @@
           </a:p>
         </p:txBody>
       </p:sp>
-      <mc:AlternateContent xmlns:mc="http://schemas.openxmlformats.org/markup-compatibility/2006">
-        <mc:Choice xmlns:a14="http://schemas.microsoft.com/office/drawing/2010/main" Requires="a14">
+      <mc:AlternateContent xmlns:mc="http://schemas.openxmlformats.org/markup-compatibility/2006" xmlns:a14="http://schemas.microsoft.com/office/drawing/2010/main">
+        <mc:Choice Requires="a14">
           <p:sp>
             <p:nvSpPr>
               <p:cNvPr id="7" name="正方形/長方形 6">
@@ -2888,7 +2888,7 @@
             </p:txBody>
           </p:sp>
         </mc:Choice>
-        <mc:Fallback>
+        <mc:Fallback xmlns="">
           <p:sp>
             <p:nvSpPr>
               <p:cNvPr id="7" name="正方形/長方形 6">
@@ -4122,8 +4122,8 @@
           </a:graphicData>
         </a:graphic>
       </p:graphicFrame>
-      <mc:AlternateContent xmlns:mc="http://schemas.openxmlformats.org/markup-compatibility/2006">
-        <mc:Choice xmlns:a14="http://schemas.microsoft.com/office/drawing/2010/main" Requires="a14">
+      <mc:AlternateContent xmlns:mc="http://schemas.openxmlformats.org/markup-compatibility/2006" xmlns:a14="http://schemas.microsoft.com/office/drawing/2010/main">
+        <mc:Choice Requires="a14">
           <p:sp>
             <p:nvSpPr>
               <p:cNvPr id="46" name="テキスト ボックス 45">
@@ -4178,7 +4178,7 @@
             </p:txBody>
           </p:sp>
         </mc:Choice>
-        <mc:Fallback>
+        <mc:Fallback xmlns="">
           <p:sp>
             <p:nvSpPr>
               <p:cNvPr id="46" name="テキスト ボックス 45">
@@ -4367,8 +4367,8 @@
           </a:p>
         </p:txBody>
       </p:sp>
-      <mc:AlternateContent xmlns:mc="http://schemas.openxmlformats.org/markup-compatibility/2006">
-        <mc:Choice xmlns:a14="http://schemas.microsoft.com/office/drawing/2010/main" Requires="a14">
+      <mc:AlternateContent xmlns:mc="http://schemas.openxmlformats.org/markup-compatibility/2006" xmlns:a14="http://schemas.microsoft.com/office/drawing/2010/main">
+        <mc:Choice Requires="a14">
           <p:sp>
             <p:nvSpPr>
               <p:cNvPr id="5" name="正方形/長方形 4">
@@ -4475,7 +4475,7 @@
             </p:txBody>
           </p:sp>
         </mc:Choice>
-        <mc:Fallback>
+        <mc:Fallback xmlns="">
           <p:sp>
             <p:nvSpPr>
               <p:cNvPr id="5" name="正方形/長方形 4">
@@ -5677,8 +5677,8 @@
           </a:p>
         </p:txBody>
       </p:sp>
-      <mc:AlternateContent xmlns:mc="http://schemas.openxmlformats.org/markup-compatibility/2006">
-        <mc:Choice xmlns:a14="http://schemas.microsoft.com/office/drawing/2010/main" Requires="a14">
+      <mc:AlternateContent xmlns:mc="http://schemas.openxmlformats.org/markup-compatibility/2006" xmlns:a14="http://schemas.microsoft.com/office/drawing/2010/main">
+        <mc:Choice Requires="a14">
           <p:sp>
             <p:nvSpPr>
               <p:cNvPr id="28" name="テキスト ボックス 27">
@@ -5732,7 +5732,7 @@
             </p:txBody>
           </p:sp>
         </mc:Choice>
-        <mc:Fallback>
+        <mc:Fallback xmlns="">
           <p:sp>
             <p:nvSpPr>
               <p:cNvPr id="28" name="テキスト ボックス 27">
@@ -5839,8 +5839,8 @@
           </a:p>
         </p:txBody>
       </p:sp>
-      <mc:AlternateContent xmlns:mc="http://schemas.openxmlformats.org/markup-compatibility/2006">
-        <mc:Choice xmlns:a14="http://schemas.microsoft.com/office/drawing/2010/main" Requires="a14">
+      <mc:AlternateContent xmlns:mc="http://schemas.openxmlformats.org/markup-compatibility/2006" xmlns:a14="http://schemas.microsoft.com/office/drawing/2010/main">
+        <mc:Choice Requires="a14">
           <p:sp>
             <p:nvSpPr>
               <p:cNvPr id="30" name="テキスト ボックス 29">
@@ -5894,7 +5894,7 @@
             </p:txBody>
           </p:sp>
         </mc:Choice>
-        <mc:Fallback>
+        <mc:Fallback xmlns="">
           <p:sp>
             <p:nvSpPr>
               <p:cNvPr id="30" name="テキスト ボックス 29">
@@ -5939,8 +5939,8 @@
           </p:sp>
         </mc:Fallback>
       </mc:AlternateContent>
-      <mc:AlternateContent xmlns:mc="http://schemas.openxmlformats.org/markup-compatibility/2006">
-        <mc:Choice xmlns:a14="http://schemas.microsoft.com/office/drawing/2010/main" Requires="a14">
+      <mc:AlternateContent xmlns:mc="http://schemas.openxmlformats.org/markup-compatibility/2006" xmlns:a14="http://schemas.microsoft.com/office/drawing/2010/main">
+        <mc:Choice Requires="a14">
           <p:sp>
             <p:nvSpPr>
               <p:cNvPr id="31" name="テキスト ボックス 30">
@@ -5994,7 +5994,7 @@
             </p:txBody>
           </p:sp>
         </mc:Choice>
-        <mc:Fallback>
+        <mc:Fallback xmlns="">
           <p:sp>
             <p:nvSpPr>
               <p:cNvPr id="31" name="テキスト ボックス 30">
@@ -6376,8 +6376,8 @@
           </a:p>
         </p:txBody>
       </p:sp>
-      <mc:AlternateContent xmlns:mc="http://schemas.openxmlformats.org/markup-compatibility/2006">
-        <mc:Choice xmlns:a14="http://schemas.microsoft.com/office/drawing/2010/main" Requires="a14">
+      <mc:AlternateContent xmlns:mc="http://schemas.openxmlformats.org/markup-compatibility/2006" xmlns:a14="http://schemas.microsoft.com/office/drawing/2010/main">
+        <mc:Choice Requires="a14">
           <p:sp>
             <p:nvSpPr>
               <p:cNvPr id="42" name="正方形/長方形 41">
@@ -6473,7 +6473,7 @@
             </p:txBody>
           </p:sp>
         </mc:Choice>
-        <mc:Fallback>
+        <mc:Fallback xmlns="">
           <p:sp>
             <p:nvSpPr>
               <p:cNvPr id="42" name="正方形/長方形 41">
@@ -6626,15 +6626,33 @@
                                   </p:childTnLst>
                                 </p:cTn>
                               </p:par>
+                            </p:childTnLst>
+                          </p:cTn>
+                        </p:par>
+                      </p:childTnLst>
+                    </p:cTn>
+                  </p:par>
+                  <p:par>
+                    <p:cTn id="7" fill="hold">
+                      <p:stCondLst>
+                        <p:cond delay="indefinite"/>
+                      </p:stCondLst>
+                      <p:childTnLst>
+                        <p:par>
+                          <p:cTn id="8" fill="hold">
+                            <p:stCondLst>
+                              <p:cond delay="0"/>
+                            </p:stCondLst>
+                            <p:childTnLst>
                               <p:par>
-                                <p:cTn id="7" presetID="1" presetClass="entr" presetSubtype="0" fill="hold" grpId="0" nodeType="withEffect">
+                                <p:cTn id="9" presetID="1" presetClass="entr" presetSubtype="0" fill="hold" grpId="0" nodeType="clickEffect">
                                   <p:stCondLst>
                                     <p:cond delay="0"/>
                                   </p:stCondLst>
                                   <p:childTnLst>
                                     <p:set>
                                       <p:cBhvr>
-                                        <p:cTn id="8" dur="1" fill="hold">
+                                        <p:cTn id="10" dur="1" fill="hold">
                                           <p:stCondLst>
                                             <p:cond delay="0"/>
                                           </p:stCondLst>
@@ -6660,26 +6678,26 @@
                     </p:cTn>
                   </p:par>
                   <p:par>
-                    <p:cTn id="9" fill="hold">
+                    <p:cTn id="11" fill="hold">
                       <p:stCondLst>
                         <p:cond delay="indefinite"/>
                       </p:stCondLst>
                       <p:childTnLst>
                         <p:par>
-                          <p:cTn id="10" fill="hold">
+                          <p:cTn id="12" fill="hold">
                             <p:stCondLst>
                               <p:cond delay="0"/>
                             </p:stCondLst>
                             <p:childTnLst>
                               <p:par>
-                                <p:cTn id="11" presetID="1" presetClass="entr" presetSubtype="0" fill="hold" grpId="0" nodeType="clickEffect">
+                                <p:cTn id="13" presetID="1" presetClass="entr" presetSubtype="0" fill="hold" grpId="0" nodeType="clickEffect">
                                   <p:stCondLst>
                                     <p:cond delay="0"/>
                                   </p:stCondLst>
                                   <p:childTnLst>
                                     <p:set>
                                       <p:cBhvr>
-                                        <p:cTn id="12" dur="1" fill="hold">
+                                        <p:cTn id="14" dur="1" fill="hold">
                                           <p:stCondLst>
                                             <p:cond delay="0"/>
                                           </p:stCondLst>
@@ -6705,46 +6723,19 @@
                     </p:cTn>
                   </p:par>
                   <p:par>
-                    <p:cTn id="13" fill="hold">
+                    <p:cTn id="15" fill="hold">
                       <p:stCondLst>
                         <p:cond delay="indefinite"/>
                       </p:stCondLst>
                       <p:childTnLst>
                         <p:par>
-                          <p:cTn id="14" fill="hold">
+                          <p:cTn id="16" fill="hold">
                             <p:stCondLst>
                               <p:cond delay="0"/>
                             </p:stCondLst>
                             <p:childTnLst>
                               <p:par>
-                                <p:cTn id="15" presetID="1" presetClass="exit" presetSubtype="0" fill="hold" grpId="1" nodeType="clickEffect">
-                                  <p:stCondLst>
-                                    <p:cond delay="0"/>
-                                  </p:stCondLst>
-                                  <p:childTnLst>
-                                    <p:set>
-                                      <p:cBhvr>
-                                        <p:cTn id="16" dur="1" fill="hold">
-                                          <p:stCondLst>
-                                            <p:cond delay="0"/>
-                                          </p:stCondLst>
-                                        </p:cTn>
-                                        <p:tgtEl>
-                                          <p:spTgt spid="35"/>
-                                        </p:tgtEl>
-                                        <p:attrNameLst>
-                                          <p:attrName>style.visibility</p:attrName>
-                                        </p:attrNameLst>
-                                      </p:cBhvr>
-                                      <p:to>
-                                        <p:strVal val="hidden"/>
-                                      </p:to>
-                                    </p:set>
-                                  </p:childTnLst>
-                                </p:cTn>
-                              </p:par>
-                              <p:par>
-                                <p:cTn id="17" presetID="1" presetClass="exit" presetSubtype="0" fill="hold" grpId="1" nodeType="withEffect">
+                                <p:cTn id="17" presetID="1" presetClass="exit" presetSubtype="0" fill="hold" grpId="1" nodeType="clickEffect">
                                   <p:stCondLst>
                                     <p:cond delay="0"/>
                                   </p:stCondLst>
@@ -6757,7 +6748,7 @@
                                           </p:stCondLst>
                                         </p:cTn>
                                         <p:tgtEl>
-                                          <p:spTgt spid="36"/>
+                                          <p:spTgt spid="35"/>
                                         </p:tgtEl>
                                         <p:attrNameLst>
                                           <p:attrName>style.visibility</p:attrName>
@@ -6784,6 +6775,33 @@
                                           </p:stCondLst>
                                         </p:cTn>
                                         <p:tgtEl>
+                                          <p:spTgt spid="36"/>
+                                        </p:tgtEl>
+                                        <p:attrNameLst>
+                                          <p:attrName>style.visibility</p:attrName>
+                                        </p:attrNameLst>
+                                      </p:cBhvr>
+                                      <p:to>
+                                        <p:strVal val="hidden"/>
+                                      </p:to>
+                                    </p:set>
+                                  </p:childTnLst>
+                                </p:cTn>
+                              </p:par>
+                              <p:par>
+                                <p:cTn id="21" presetID="1" presetClass="exit" presetSubtype="0" fill="hold" grpId="1" nodeType="withEffect">
+                                  <p:stCondLst>
+                                    <p:cond delay="0"/>
+                                  </p:stCondLst>
+                                  <p:childTnLst>
+                                    <p:set>
+                                      <p:cBhvr>
+                                        <p:cTn id="22" dur="1" fill="hold">
+                                          <p:stCondLst>
+                                            <p:cond delay="0"/>
+                                          </p:stCondLst>
+                                        </p:cTn>
+                                        <p:tgtEl>
                                           <p:spTgt spid="37"/>
                                         </p:tgtEl>
                                         <p:attrNameLst>
@@ -6804,46 +6822,19 @@
                     </p:cTn>
                   </p:par>
                   <p:par>
-                    <p:cTn id="21" fill="hold">
+                    <p:cTn id="23" fill="hold">
                       <p:stCondLst>
                         <p:cond delay="indefinite"/>
                       </p:stCondLst>
                       <p:childTnLst>
                         <p:par>
-                          <p:cTn id="22" fill="hold">
+                          <p:cTn id="24" fill="hold">
                             <p:stCondLst>
                               <p:cond delay="0"/>
                             </p:stCondLst>
                             <p:childTnLst>
                               <p:par>
-                                <p:cTn id="23" presetID="1" presetClass="entr" presetSubtype="0" fill="hold" grpId="0" nodeType="clickEffect">
-                                  <p:stCondLst>
-                                    <p:cond delay="0"/>
-                                  </p:stCondLst>
-                                  <p:childTnLst>
-                                    <p:set>
-                                      <p:cBhvr>
-                                        <p:cTn id="24" dur="1" fill="hold">
-                                          <p:stCondLst>
-                                            <p:cond delay="0"/>
-                                          </p:stCondLst>
-                                        </p:cTn>
-                                        <p:tgtEl>
-                                          <p:spTgt spid="33"/>
-                                        </p:tgtEl>
-                                        <p:attrNameLst>
-                                          <p:attrName>style.visibility</p:attrName>
-                                        </p:attrNameLst>
-                                      </p:cBhvr>
-                                      <p:to>
-                                        <p:strVal val="visible"/>
-                                      </p:to>
-                                    </p:set>
-                                  </p:childTnLst>
-                                </p:cTn>
-                              </p:par>
-                              <p:par>
-                                <p:cTn id="25" presetID="1" presetClass="entr" presetSubtype="0" fill="hold" grpId="0" nodeType="withEffect">
+                                <p:cTn id="25" presetID="1" presetClass="entr" presetSubtype="0" fill="hold" grpId="0" nodeType="clickEffect">
                                   <p:stCondLst>
                                     <p:cond delay="0"/>
                                   </p:stCondLst>
@@ -6856,7 +6847,7 @@
                                           </p:stCondLst>
                                         </p:cTn>
                                         <p:tgtEl>
-                                          <p:spTgt spid="34"/>
+                                          <p:spTgt spid="33"/>
                                         </p:tgtEl>
                                         <p:attrNameLst>
                                           <p:attrName>style.visibility</p:attrName>
@@ -6914,15 +6905,78 @@
                                   </p:childTnLst>
                                 </p:cTn>
                               </p:par>
+                            </p:childTnLst>
+                          </p:cTn>
+                        </p:par>
+                      </p:childTnLst>
+                    </p:cTn>
+                  </p:par>
+                  <p:par>
+                    <p:cTn id="31" fill="hold">
+                      <p:stCondLst>
+                        <p:cond delay="indefinite"/>
+                      </p:stCondLst>
+                      <p:childTnLst>
+                        <p:par>
+                          <p:cTn id="32" fill="hold">
+                            <p:stCondLst>
+                              <p:cond delay="0"/>
+                            </p:stCondLst>
+                            <p:childTnLst>
                               <p:par>
-                                <p:cTn id="31" presetID="1" presetClass="exit" presetSubtype="0" fill="hold" grpId="1" nodeType="withEffect">
+                                <p:cTn id="33" presetID="1" presetClass="entr" presetSubtype="0" fill="hold" grpId="0" nodeType="clickEffect">
                                   <p:stCondLst>
                                     <p:cond delay="0"/>
                                   </p:stCondLst>
                                   <p:childTnLst>
                                     <p:set>
                                       <p:cBhvr>
-                                        <p:cTn id="32" dur="1" fill="hold">
+                                        <p:cTn id="34" dur="1" fill="hold">
+                                          <p:stCondLst>
+                                            <p:cond delay="0"/>
+                                          </p:stCondLst>
+                                        </p:cTn>
+                                        <p:tgtEl>
+                                          <p:spTgt spid="34"/>
+                                        </p:tgtEl>
+                                        <p:attrNameLst>
+                                          <p:attrName>style.visibility</p:attrName>
+                                        </p:attrNameLst>
+                                      </p:cBhvr>
+                                      <p:to>
+                                        <p:strVal val="visible"/>
+                                      </p:to>
+                                    </p:set>
+                                  </p:childTnLst>
+                                </p:cTn>
+                              </p:par>
+                            </p:childTnLst>
+                          </p:cTn>
+                        </p:par>
+                      </p:childTnLst>
+                    </p:cTn>
+                  </p:par>
+                  <p:par>
+                    <p:cTn id="35" fill="hold">
+                      <p:stCondLst>
+                        <p:cond delay="indefinite"/>
+                      </p:stCondLst>
+                      <p:childTnLst>
+                        <p:par>
+                          <p:cTn id="36" fill="hold">
+                            <p:stCondLst>
+                              <p:cond delay="0"/>
+                            </p:stCondLst>
+                            <p:childTnLst>
+                              <p:par>
+                                <p:cTn id="37" presetID="1" presetClass="exit" presetSubtype="0" fill="hold" grpId="1" nodeType="clickEffect">
+                                  <p:stCondLst>
+                                    <p:cond delay="0"/>
+                                  </p:stCondLst>
+                                  <p:childTnLst>
+                                    <p:set>
+                                      <p:cBhvr>
+                                        <p:cTn id="38" dur="1" fill="hold">
                                           <p:stCondLst>
                                             <p:cond delay="0"/>
                                           </p:stCondLst>
@@ -6936,6 +6990,78 @@
                                       </p:cBhvr>
                                       <p:to>
                                         <p:strVal val="hidden"/>
+                                      </p:to>
+                                    </p:set>
+                                  </p:childTnLst>
+                                </p:cTn>
+                              </p:par>
+                            </p:childTnLst>
+                          </p:cTn>
+                        </p:par>
+                      </p:childTnLst>
+                    </p:cTn>
+                  </p:par>
+                  <p:par>
+                    <p:cTn id="39" fill="hold">
+                      <p:stCondLst>
+                        <p:cond delay="indefinite"/>
+                      </p:stCondLst>
+                      <p:childTnLst>
+                        <p:par>
+                          <p:cTn id="40" fill="hold">
+                            <p:stCondLst>
+                              <p:cond delay="0"/>
+                            </p:stCondLst>
+                            <p:childTnLst>
+                              <p:par>
+                                <p:cTn id="41" presetID="1" presetClass="entr" presetSubtype="0" fill="hold" grpId="0" nodeType="clickEffect">
+                                  <p:stCondLst>
+                                    <p:cond delay="0"/>
+                                  </p:stCondLst>
+                                  <p:childTnLst>
+                                    <p:set>
+                                      <p:cBhvr>
+                                        <p:cTn id="42" dur="1" fill="hold">
+                                          <p:stCondLst>
+                                            <p:cond delay="0"/>
+                                          </p:stCondLst>
+                                        </p:cTn>
+                                        <p:tgtEl>
+                                          <p:spTgt spid="42"/>
+                                        </p:tgtEl>
+                                        <p:attrNameLst>
+                                          <p:attrName>style.visibility</p:attrName>
+                                        </p:attrNameLst>
+                                      </p:cBhvr>
+                                      <p:to>
+                                        <p:strVal val="visible"/>
+                                      </p:to>
+                                    </p:set>
+                                  </p:childTnLst>
+                                </p:cTn>
+                              </p:par>
+                              <p:par>
+                                <p:cTn id="43" presetID="1" presetClass="entr" presetSubtype="0" fill="hold" grpId="0" nodeType="withEffect">
+                                  <p:stCondLst>
+                                    <p:cond delay="0"/>
+                                  </p:stCondLst>
+                                  <p:childTnLst>
+                                    <p:set>
+                                      <p:cBhvr>
+                                        <p:cTn id="44" dur="1" fill="hold">
+                                          <p:stCondLst>
+                                            <p:cond delay="0"/>
+                                          </p:stCondLst>
+                                        </p:cTn>
+                                        <p:tgtEl>
+                                          <p:spTgt spid="43"/>
+                                        </p:tgtEl>
+                                        <p:attrNameLst>
+                                          <p:attrName>style.visibility</p:attrName>
+                                        </p:attrNameLst>
+                                      </p:cBhvr>
+                                      <p:to>
+                                        <p:strVal val="visible"/>
                                       </p:to>
                                     </p:set>
                                   </p:childTnLst>
@@ -6979,6 +7105,8 @@
       <p:bldP spid="36" grpId="1" animBg="1"/>
       <p:bldP spid="37" grpId="0" animBg="1"/>
       <p:bldP spid="37" grpId="1" animBg="1"/>
+      <p:bldP spid="42" grpId="0" animBg="1"/>
+      <p:bldP spid="43" grpId="0" animBg="1"/>
     </p:bldLst>
   </p:timing>
 </p:sld>
@@ -9511,8 +9639,8 @@
           </a:p>
         </p:txBody>
       </p:sp>
-      <mc:AlternateContent xmlns:mc="http://schemas.openxmlformats.org/markup-compatibility/2006">
-        <mc:Choice xmlns:a14="http://schemas.microsoft.com/office/drawing/2010/main" Requires="a14">
+      <mc:AlternateContent xmlns:mc="http://schemas.openxmlformats.org/markup-compatibility/2006" xmlns:a14="http://schemas.microsoft.com/office/drawing/2010/main">
+        <mc:Choice Requires="a14">
           <p:sp>
             <p:nvSpPr>
               <p:cNvPr id="20" name="正方形/長方形 19">
@@ -9632,7 +9760,7 @@
             </p:txBody>
           </p:sp>
         </mc:Choice>
-        <mc:Fallback>
+        <mc:Fallback xmlns="">
           <p:sp>
             <p:nvSpPr>
               <p:cNvPr id="20" name="正方形/長方形 19">

</xml_diff>